<commit_message>
Notes and PPT update
</commit_message>
<xml_diff>
--- a/KOyourMVC.pptx
+++ b/KOyourMVC.pptx
@@ -483,7 +483,7 @@
               <a:pPr>
                 <a:defRPr/>
               </a:pPr>
-              <a:t>5/19/2012</a:t>
+              <a:t>6/12/2012</a:t>
             </a:fld>
             <a:endParaRPr lang="en-US"/>
           </a:p>
@@ -5752,11 +5752,7 @@
             </a:pPr>
             <a:r>
               <a:rPr lang="en-US" sz="6000" dirty="0" smtClean="0"/>
-              <a:t>              KO </a:t>
-            </a:r>
-            <a:r>
-              <a:rPr lang="en-US" sz="6000" dirty="0" smtClean="0"/>
-              <a:t>your MVC</a:t>
+              <a:t>              KO your MVC</a:t>
             </a:r>
           </a:p>
         </p:txBody>
@@ -6361,7 +6357,15 @@
                   <a:srgbClr val="000000"/>
                 </a:solidFill>
               </a:rPr>
-              <a:t>Dependent or Computer Observables</a:t>
+              <a:t>Dependent/Computed </a:t>
+            </a:r>
+            <a:r>
+              <a:rPr lang="en-US" sz="2400" kern="0" dirty="0" smtClean="0">
+                <a:solidFill>
+                  <a:srgbClr val="000000"/>
+                </a:solidFill>
+              </a:rPr>
+              <a:t>Observables</a:t>
             </a:r>
           </a:p>
         </p:txBody>
@@ -6495,13 +6499,8 @@
             </a:r>
             <a:r>
               <a:rPr lang="en-US" sz="5400" dirty="0" smtClean="0"/>
-              <a:t> is great for prototyping but real men use </a:t>
-            </a:r>
-            <a:r>
-              <a:rPr lang="en-US" sz="5400" dirty="0" smtClean="0"/>
-              <a:t>a true IDE</a:t>
-            </a:r>
-            <a:endParaRPr lang="en-US" sz="5400" dirty="0" smtClean="0"/>
+              <a:t> is great for prototyping but real men use a true IDE</a:t>
+            </a:r>
           </a:p>
         </p:txBody>
       </p:sp>
@@ -9284,25 +9283,7 @@
               <a:rPr lang="en-US" dirty="0" smtClean="0">
                 <a:sym typeface="Wingdings" pitchFamily="2" charset="2"/>
               </a:rPr>
-              <a:t>Sample MVC App: </a:t>
-            </a:r>
-            <a:r>
-              <a:rPr lang="en-US" dirty="0" smtClean="0">
-                <a:sym typeface="Wingdings" pitchFamily="2" charset="2"/>
-              </a:rPr>
-              <a:t>Adding </a:t>
-            </a:r>
-            <a:r>
-              <a:rPr lang="en-US" dirty="0" smtClean="0">
-                <a:sym typeface="Wingdings" pitchFamily="2" charset="2"/>
-              </a:rPr>
-              <a:t>in the </a:t>
-            </a:r>
-            <a:r>
-              <a:rPr lang="en-US" dirty="0" smtClean="0">
-                <a:sym typeface="Wingdings" pitchFamily="2" charset="2"/>
-              </a:rPr>
-              <a:t>server side</a:t>
+              <a:t>Sample MVC App: Adding in the server side</a:t>
             </a:r>
             <a:endParaRPr lang="en-US" b="1" dirty="0">
               <a:sym typeface="Wingdings" pitchFamily="2" charset="2"/>
@@ -15206,49 +15187,16 @@
 </file>
 
 <file path=customXml/item1.xml><?xml version="1.0" encoding="utf-8"?>
-<?mso-contentType ?>
-<spe:Receivers xmlns:spe="http://schemas.microsoft.com/sharepoint/events">
-  <Receiver>
-    <Name>Document ID Generator</Name>
-    <Synchronization>Synchronous</Synchronization>
-    <Type>10001</Type>
-    <SequenceNumber>1000</SequenceNumber>
-    <Assembly>Microsoft.Office.DocumentManagement, Version=14.0.0.0, Culture=neutral, PublicKeyToken=71e9bce111e9429c</Assembly>
-    <Class>Microsoft.Office.DocumentManagement.Internal.DocIdHandler</Class>
-    <Data/>
-    <Filter/>
-  </Receiver>
-  <Receiver>
-    <Name>Document ID Generator</Name>
-    <Synchronization>Synchronous</Synchronization>
-    <Type>10002</Type>
-    <SequenceNumber>1001</SequenceNumber>
-    <Assembly>Microsoft.Office.DocumentManagement, Version=14.0.0.0, Culture=neutral, PublicKeyToken=71e9bce111e9429c</Assembly>
-    <Class>Microsoft.Office.DocumentManagement.Internal.DocIdHandler</Class>
-    <Data/>
-    <Filter/>
-  </Receiver>
-  <Receiver>
-    <Name>Document ID Generator</Name>
-    <Synchronization>Synchronous</Synchronization>
-    <Type>10004</Type>
-    <SequenceNumber>1002</SequenceNumber>
-    <Assembly>Microsoft.Office.DocumentManagement, Version=14.0.0.0, Culture=neutral, PublicKeyToken=71e9bce111e9429c</Assembly>
-    <Class>Microsoft.Office.DocumentManagement.Internal.DocIdHandler</Class>
-    <Data/>
-    <Filter/>
-  </Receiver>
-  <Receiver>
-    <Name>Document ID Generator</Name>
-    <Synchronization>Synchronous</Synchronization>
-    <Type>10006</Type>
-    <SequenceNumber>1003</SequenceNumber>
-    <Assembly>Microsoft.Office.DocumentManagement, Version=14.0.0.0, Culture=neutral, PublicKeyToken=71e9bce111e9429c</Assembly>
-    <Class>Microsoft.Office.DocumentManagement.Internal.DocIdHandler</Class>
-    <Data/>
-    <Filter/>
-  </Receiver>
-</spe:Receivers>
+<p:properties xmlns:p="http://schemas.microsoft.com/office/2006/metadata/properties" xmlns:xsi="http://www.w3.org/2001/XMLSchema-instance" xmlns:pc="http://schemas.microsoft.com/office/infopath/2007/PartnerControls">
+  <documentManagement>
+    <Description0 xmlns="1e37aee8-73ad-441e-bced-8b530ad9291b">PowerPoint template with Microsoft Partner Network logo on it.</Description0>
+    <_dlc_DocId xmlns="52ad97b0-86c1-49b5-b544-c488bf38e7c0">SAZVWXQSR7YH-3011-7</_dlc_DocId>
+    <_dlc_DocIdUrl xmlns="52ad97b0-86c1-49b5-b544-c488bf38e7c0">
+      <Url>https://my.skylinetechnologies.com/Support/SalesMarketingCenter/branding/_layouts/DocIdRedir.aspx?ID=SAZVWXQSR7YH-3011-7</Url>
+      <Description>SAZVWXQSR7YH-3011-7</Description>
+    </_dlc_DocIdUrl>
+  </documentManagement>
+</p:properties>
 </file>
 
 <file path=customXml/item2.xml><?xml version="1.0" encoding="utf-8"?>
@@ -15410,16 +15358,49 @@
 </file>
 
 <file path=customXml/item3.xml><?xml version="1.0" encoding="utf-8"?>
-<p:properties xmlns:p="http://schemas.microsoft.com/office/2006/metadata/properties" xmlns:xsi="http://www.w3.org/2001/XMLSchema-instance" xmlns:pc="http://schemas.microsoft.com/office/infopath/2007/PartnerControls">
-  <documentManagement>
-    <Description0 xmlns="1e37aee8-73ad-441e-bced-8b530ad9291b">PowerPoint template with Microsoft Partner Network logo on it.</Description0>
-    <_dlc_DocId xmlns="52ad97b0-86c1-49b5-b544-c488bf38e7c0">SAZVWXQSR7YH-3011-7</_dlc_DocId>
-    <_dlc_DocIdUrl xmlns="52ad97b0-86c1-49b5-b544-c488bf38e7c0">
-      <Url>https://my.skylinetechnologies.com/Support/SalesMarketingCenter/branding/_layouts/DocIdRedir.aspx?ID=SAZVWXQSR7YH-3011-7</Url>
-      <Description>SAZVWXQSR7YH-3011-7</Description>
-    </_dlc_DocIdUrl>
-  </documentManagement>
-</p:properties>
+<?mso-contentType ?>
+<spe:Receivers xmlns:spe="http://schemas.microsoft.com/sharepoint/events">
+  <Receiver>
+    <Name>Document ID Generator</Name>
+    <Synchronization>Synchronous</Synchronization>
+    <Type>10001</Type>
+    <SequenceNumber>1000</SequenceNumber>
+    <Assembly>Microsoft.Office.DocumentManagement, Version=14.0.0.0, Culture=neutral, PublicKeyToken=71e9bce111e9429c</Assembly>
+    <Class>Microsoft.Office.DocumentManagement.Internal.DocIdHandler</Class>
+    <Data/>
+    <Filter/>
+  </Receiver>
+  <Receiver>
+    <Name>Document ID Generator</Name>
+    <Synchronization>Synchronous</Synchronization>
+    <Type>10002</Type>
+    <SequenceNumber>1001</SequenceNumber>
+    <Assembly>Microsoft.Office.DocumentManagement, Version=14.0.0.0, Culture=neutral, PublicKeyToken=71e9bce111e9429c</Assembly>
+    <Class>Microsoft.Office.DocumentManagement.Internal.DocIdHandler</Class>
+    <Data/>
+    <Filter/>
+  </Receiver>
+  <Receiver>
+    <Name>Document ID Generator</Name>
+    <Synchronization>Synchronous</Synchronization>
+    <Type>10004</Type>
+    <SequenceNumber>1002</SequenceNumber>
+    <Assembly>Microsoft.Office.DocumentManagement, Version=14.0.0.0, Culture=neutral, PublicKeyToken=71e9bce111e9429c</Assembly>
+    <Class>Microsoft.Office.DocumentManagement.Internal.DocIdHandler</Class>
+    <Data/>
+    <Filter/>
+  </Receiver>
+  <Receiver>
+    <Name>Document ID Generator</Name>
+    <Synchronization>Synchronous</Synchronization>
+    <Type>10006</Type>
+    <SequenceNumber>1003</SequenceNumber>
+    <Assembly>Microsoft.Office.DocumentManagement, Version=14.0.0.0, Culture=neutral, PublicKeyToken=71e9bce111e9429c</Assembly>
+    <Class>Microsoft.Office.DocumentManagement.Internal.DocIdHandler</Class>
+    <Data/>
+    <Filter/>
+  </Receiver>
+</spe:Receivers>
 </file>
 
 <file path=customXml/item4.xml><?xml version="1.0" encoding="utf-8"?>
@@ -15432,9 +15413,18 @@
 </file>
 
 <file path=customXml/itemProps1.xml><?xml version="1.0" encoding="utf-8"?>
-<ds:datastoreItem xmlns:ds="http://schemas.openxmlformats.org/officeDocument/2006/customXml" ds:itemID="{0068A067-F354-4585-8169-FC99DA836E1C}">
+<ds:datastoreItem xmlns:ds="http://schemas.openxmlformats.org/officeDocument/2006/customXml" ds:itemID="{9F5040E5-4564-49C1-9147-56F1700A1C56}">
   <ds:schemaRefs>
-    <ds:schemaRef ds:uri="http://schemas.microsoft.com/sharepoint/events"/>
+    <ds:schemaRef ds:uri="http://schemas.microsoft.com/office/2006/documentManagement/types"/>
+    <ds:schemaRef ds:uri="http://www.w3.org/XML/1998/namespace"/>
+    <ds:schemaRef ds:uri="1e37aee8-73ad-441e-bced-8b530ad9291b"/>
+    <ds:schemaRef ds:uri="http://purl.org/dc/elements/1.1/"/>
+    <ds:schemaRef ds:uri="http://schemas.microsoft.com/office/2006/metadata/properties"/>
+    <ds:schemaRef ds:uri="http://schemas.microsoft.com/office/infopath/2007/PartnerControls"/>
+    <ds:schemaRef ds:uri="http://purl.org/dc/dcmitype/"/>
+    <ds:schemaRef ds:uri="http://purl.org/dc/terms/"/>
+    <ds:schemaRef ds:uri="52ad97b0-86c1-49b5-b544-c488bf38e7c0"/>
+    <ds:schemaRef ds:uri="http://schemas.openxmlformats.org/package/2006/metadata/core-properties"/>
   </ds:schemaRefs>
 </ds:datastoreItem>
 </file>
@@ -15459,18 +15449,9 @@
 </file>
 
 <file path=customXml/itemProps3.xml><?xml version="1.0" encoding="utf-8"?>
-<ds:datastoreItem xmlns:ds="http://schemas.openxmlformats.org/officeDocument/2006/customXml" ds:itemID="{9F5040E5-4564-49C1-9147-56F1700A1C56}">
+<ds:datastoreItem xmlns:ds="http://schemas.openxmlformats.org/officeDocument/2006/customXml" ds:itemID="{0068A067-F354-4585-8169-FC99DA836E1C}">
   <ds:schemaRefs>
-    <ds:schemaRef ds:uri="http://schemas.microsoft.com/office/2006/documentManagement/types"/>
-    <ds:schemaRef ds:uri="http://www.w3.org/XML/1998/namespace"/>
-    <ds:schemaRef ds:uri="1e37aee8-73ad-441e-bced-8b530ad9291b"/>
-    <ds:schemaRef ds:uri="http://purl.org/dc/elements/1.1/"/>
-    <ds:schemaRef ds:uri="http://schemas.microsoft.com/office/2006/metadata/properties"/>
-    <ds:schemaRef ds:uri="http://schemas.microsoft.com/office/infopath/2007/PartnerControls"/>
-    <ds:schemaRef ds:uri="http://purl.org/dc/dcmitype/"/>
-    <ds:schemaRef ds:uri="http://purl.org/dc/terms/"/>
-    <ds:schemaRef ds:uri="52ad97b0-86c1-49b5-b544-c488bf38e7c0"/>
-    <ds:schemaRef ds:uri="http://schemas.openxmlformats.org/package/2006/metadata/core-properties"/>
+    <ds:schemaRef ds:uri="http://schemas.microsoft.com/sharepoint/events"/>
   </ds:schemaRefs>
 </ds:datastoreItem>
 </file>

</xml_diff>